<commit_message>
updating images for removing juice and adding hard copies
</commit_message>
<xml_diff>
--- a/img/powerpointforimages.pptx
+++ b/img/powerpointforimages.pptx
@@ -259,7 +259,7 @@
           <a:p>
             <a:fld id="{B53D9C78-18F2-3047-BB1B-5721F2CA4AAE}" type="datetimeFigureOut">
               <a:rPr lang="en-US" smtClean="0"/>
-              <a:t>10/6/20</a:t>
+              <a:t>11/17/20</a:t>
             </a:fld>
             <a:endParaRPr lang="en-US"/>
           </a:p>
@@ -429,7 +429,7 @@
           <a:p>
             <a:fld id="{B53D9C78-18F2-3047-BB1B-5721F2CA4AAE}" type="datetimeFigureOut">
               <a:rPr lang="en-US" smtClean="0"/>
-              <a:t>10/6/20</a:t>
+              <a:t>11/17/20</a:t>
             </a:fld>
             <a:endParaRPr lang="en-US"/>
           </a:p>
@@ -609,7 +609,7 @@
           <a:p>
             <a:fld id="{B53D9C78-18F2-3047-BB1B-5721F2CA4AAE}" type="datetimeFigureOut">
               <a:rPr lang="en-US" smtClean="0"/>
-              <a:t>10/6/20</a:t>
+              <a:t>11/17/20</a:t>
             </a:fld>
             <a:endParaRPr lang="en-US"/>
           </a:p>
@@ -779,7 +779,7 @@
           <a:p>
             <a:fld id="{B53D9C78-18F2-3047-BB1B-5721F2CA4AAE}" type="datetimeFigureOut">
               <a:rPr lang="en-US" smtClean="0"/>
-              <a:t>10/6/20</a:t>
+              <a:t>11/17/20</a:t>
             </a:fld>
             <a:endParaRPr lang="en-US"/>
           </a:p>
@@ -1025,7 +1025,7 @@
           <a:p>
             <a:fld id="{B53D9C78-18F2-3047-BB1B-5721F2CA4AAE}" type="datetimeFigureOut">
               <a:rPr lang="en-US" smtClean="0"/>
-              <a:t>10/6/20</a:t>
+              <a:t>11/17/20</a:t>
             </a:fld>
             <a:endParaRPr lang="en-US"/>
           </a:p>
@@ -1257,7 +1257,7 @@
           <a:p>
             <a:fld id="{B53D9C78-18F2-3047-BB1B-5721F2CA4AAE}" type="datetimeFigureOut">
               <a:rPr lang="en-US" smtClean="0"/>
-              <a:t>10/6/20</a:t>
+              <a:t>11/17/20</a:t>
             </a:fld>
             <a:endParaRPr lang="en-US"/>
           </a:p>
@@ -1624,7 +1624,7 @@
           <a:p>
             <a:fld id="{B53D9C78-18F2-3047-BB1B-5721F2CA4AAE}" type="datetimeFigureOut">
               <a:rPr lang="en-US" smtClean="0"/>
-              <a:t>10/6/20</a:t>
+              <a:t>11/17/20</a:t>
             </a:fld>
             <a:endParaRPr lang="en-US"/>
           </a:p>
@@ -1742,7 +1742,7 @@
           <a:p>
             <a:fld id="{B53D9C78-18F2-3047-BB1B-5721F2CA4AAE}" type="datetimeFigureOut">
               <a:rPr lang="en-US" smtClean="0"/>
-              <a:t>10/6/20</a:t>
+              <a:t>11/17/20</a:t>
             </a:fld>
             <a:endParaRPr lang="en-US"/>
           </a:p>
@@ -1837,7 +1837,7 @@
           <a:p>
             <a:fld id="{B53D9C78-18F2-3047-BB1B-5721F2CA4AAE}" type="datetimeFigureOut">
               <a:rPr lang="en-US" smtClean="0"/>
-              <a:t>10/6/20</a:t>
+              <a:t>11/17/20</a:t>
             </a:fld>
             <a:endParaRPr lang="en-US"/>
           </a:p>
@@ -2114,7 +2114,7 @@
           <a:p>
             <a:fld id="{B53D9C78-18F2-3047-BB1B-5721F2CA4AAE}" type="datetimeFigureOut">
               <a:rPr lang="en-US" smtClean="0"/>
-              <a:t>10/6/20</a:t>
+              <a:t>11/17/20</a:t>
             </a:fld>
             <a:endParaRPr lang="en-US"/>
           </a:p>
@@ -2371,7 +2371,7 @@
           <a:p>
             <a:fld id="{B53D9C78-18F2-3047-BB1B-5721F2CA4AAE}" type="datetimeFigureOut">
               <a:rPr lang="en-US" smtClean="0"/>
-              <a:t>10/6/20</a:t>
+              <a:t>11/17/20</a:t>
             </a:fld>
             <a:endParaRPr lang="en-US"/>
           </a:p>
@@ -2584,7 +2584,7 @@
           <a:p>
             <a:fld id="{B53D9C78-18F2-3047-BB1B-5721F2CA4AAE}" type="datetimeFigureOut">
               <a:rPr lang="en-US" smtClean="0"/>
-              <a:t>10/6/20</a:t>
+              <a:t>11/17/20</a:t>
             </a:fld>
             <a:endParaRPr lang="en-US"/>
           </a:p>
@@ -4267,44 +4267,53 @@
           <a:lstStyle/>
           <a:p>
             <a:r>
-              <a:rPr lang="en-US" sz="1294"/>
+              <a:rPr lang="en-US" sz="1294" dirty="0"/>
               <a:t>recipes::juice()</a:t>
             </a:r>
           </a:p>
           <a:p>
             <a:pPr algn="ctr"/>
             <a:r>
-              <a:rPr lang="en-US" sz="1294"/>
+              <a:rPr lang="en-US" sz="1294" dirty="0"/>
               <a:t>or </a:t>
             </a:r>
           </a:p>
           <a:p>
             <a:r>
-              <a:rPr lang="en-US" sz="1294"/>
-              <a:t>recipes::bake(new_data = training data)</a:t>
+              <a:rPr lang="en-US" sz="1294" dirty="0"/>
+              <a:t>recipes::bake(</a:t>
+            </a:r>
+            <a:r>
+              <a:rPr lang="en-US" sz="1294" dirty="0" err="1"/>
+              <a:t>new_data</a:t>
+            </a:r>
+            <a:r>
+              <a:rPr lang="en-US" sz="1294" dirty="0"/>
+              <a:t> = training data)</a:t>
             </a:r>
           </a:p>
           <a:p>
             <a:pPr algn="ctr"/>
             <a:r>
-              <a:rPr lang="en-US" sz="1294"/>
+              <a:rPr lang="en-US" sz="1294" dirty="0"/>
               <a:t> or </a:t>
             </a:r>
           </a:p>
           <a:p>
             <a:r>
-              <a:rPr lang="en-US" sz="1294"/>
+              <a:rPr lang="en-US" sz="1294" dirty="0"/>
               <a:t>template of output of prep() </a:t>
             </a:r>
           </a:p>
           <a:p>
             <a:r>
-              <a:rPr lang="en-US" sz="1294"/>
+              <a:rPr lang="en-US" sz="1294" dirty="0" err="1"/>
               <a:t>prepped_rec$template</a:t>
             </a:r>
-          </a:p>
-          <a:p>
-            <a:endParaRPr lang="en-US" sz="1478"/>
+            <a:endParaRPr lang="en-US" sz="1294" dirty="0"/>
+          </a:p>
+          <a:p>
+            <a:endParaRPr lang="en-US" sz="1478" dirty="0"/>
           </a:p>
         </p:txBody>
       </p:sp>
@@ -6815,25 +6824,33 @@
           <a:lstStyle/>
           <a:p>
             <a:r>
-              <a:rPr lang="en-US" sz="1478"/>
+              <a:rPr lang="en-US" sz="1478" dirty="0"/>
               <a:t>recipes::juice()</a:t>
             </a:r>
           </a:p>
           <a:p>
             <a:pPr algn="ctr"/>
             <a:r>
-              <a:rPr lang="en-US" sz="1478"/>
+              <a:rPr lang="en-US" sz="1478" dirty="0"/>
               <a:t>or </a:t>
             </a:r>
           </a:p>
           <a:p>
             <a:r>
-              <a:rPr lang="en-US" sz="1478"/>
-              <a:t>recipes::bake(new_data = training data)</a:t>
-            </a:r>
-          </a:p>
-          <a:p>
-            <a:endParaRPr lang="en-US" sz="1478"/>
+              <a:rPr lang="en-US" sz="1478" dirty="0"/>
+              <a:t>recipes::bake(</a:t>
+            </a:r>
+            <a:r>
+              <a:rPr lang="en-US" sz="1478" dirty="0" err="1"/>
+              <a:t>new_data</a:t>
+            </a:r>
+            <a:r>
+              <a:rPr lang="en-US" sz="1478" dirty="0"/>
+              <a:t> = training data)</a:t>
+            </a:r>
+          </a:p>
+          <a:p>
+            <a:endParaRPr lang="en-US" sz="1478" dirty="0"/>
           </a:p>
         </p:txBody>
       </p:sp>
@@ -29455,7 +29472,7 @@
             <a:pPr lvl="1"/>
             <a:r>
               <a:rPr lang="en-US" sz="1663" dirty="0"/>
-              <a:t>juice() </a:t>
+              <a:t>bake() </a:t>
             </a:r>
           </a:p>
           <a:p>
@@ -37839,12 +37856,12 @@
           <a:lstStyle/>
           <a:p>
             <a:r>
-              <a:rPr lang="en-US" sz="1478"/>
+              <a:rPr lang="en-US" sz="1478" dirty="0"/>
               <a:t>recipes::juice()</a:t>
             </a:r>
           </a:p>
           <a:p>
-            <a:endParaRPr lang="en-US" sz="1478"/>
+            <a:endParaRPr lang="en-US" sz="1478" dirty="0"/>
           </a:p>
         </p:txBody>
       </p:sp>
@@ -38630,8 +38647,8 @@
         </p:nvSpPr>
         <p:spPr>
           <a:xfrm>
-            <a:off x="13737973" y="7586209"/>
-            <a:ext cx="1313886" cy="547201"/>
+            <a:off x="13392347" y="7586198"/>
+            <a:ext cx="2668616" cy="547201"/>
           </a:xfrm>
           <a:prstGeom prst="rect">
             <a:avLst/>
@@ -38645,12 +38662,12 @@
           <a:lstStyle/>
           <a:p>
             <a:r>
-              <a:rPr lang="en-US" sz="1478"/>
-              <a:t>recipes::juice()</a:t>
-            </a:r>
-          </a:p>
-          <a:p>
-            <a:endParaRPr lang="en-US" sz="1478"/>
+              <a:rPr lang="en-US" sz="1478" dirty="0"/>
+              <a:t>recipes::bake(new_data = NULL)</a:t>
+            </a:r>
+          </a:p>
+          <a:p>
+            <a:endParaRPr lang="en-US" sz="1478" dirty="0"/>
           </a:p>
         </p:txBody>
       </p:sp>

</xml_diff>